<commit_message>
DeveloperGuide.adoc: update the docs for implementation of undo/redo sequence and activity diagram
</commit_message>
<xml_diff>
--- a/docs/diagrams/UndoRedoActivityDiagram.pptx
+++ b/docs/diagrams/UndoRedoActivityDiagram.pptx
@@ -112,10 +112,6 @@
 </p:presentation>
 </file>
 
-<file path=ppt/revisionInfo.xml><?xml version="1.0" encoding="utf-8"?>
-<p1510:revInfo xmlns:a="http://schemas.openxmlformats.org/drawingml/2006/main" xmlns:r="http://schemas.openxmlformats.org/officeDocument/2006/relationships" xmlns:p1510="http://schemas.microsoft.com/office/powerpoint/2015/10/main"/>
-</file>
-
 <file path=ppt/slideLayouts/slideLayout1.xml><?xml version="1.0" encoding="utf-8"?>
 <p:sldLayout xmlns:a="http://schemas.openxmlformats.org/drawingml/2006/main" xmlns:r="http://schemas.openxmlformats.org/officeDocument/2006/relationships" xmlns:p="http://schemas.openxmlformats.org/presentationml/2006/main" type="title" preserve="1">
   <p:cSld name="Title Slide">
@@ -265,7 +261,7 @@
           <a:p>
             <a:fld id="{542F47FF-5056-41FF-A1F8-23A414798AA4}" type="datetimeFigureOut">
               <a:rPr lang="en-SG" smtClean="0"/>
-              <a:t>6/7/2018</a:t>
+              <a:t>17/10/18</a:t>
             </a:fld>
             <a:endParaRPr lang="en-SG"/>
           </a:p>
@@ -465,7 +461,7 @@
           <a:p>
             <a:fld id="{542F47FF-5056-41FF-A1F8-23A414798AA4}" type="datetimeFigureOut">
               <a:rPr lang="en-SG" smtClean="0"/>
-              <a:t>6/7/2018</a:t>
+              <a:t>17/10/18</a:t>
             </a:fld>
             <a:endParaRPr lang="en-SG"/>
           </a:p>
@@ -675,7 +671,7 @@
           <a:p>
             <a:fld id="{542F47FF-5056-41FF-A1F8-23A414798AA4}" type="datetimeFigureOut">
               <a:rPr lang="en-SG" smtClean="0"/>
-              <a:t>6/7/2018</a:t>
+              <a:t>17/10/18</a:t>
             </a:fld>
             <a:endParaRPr lang="en-SG"/>
           </a:p>
@@ -875,7 +871,7 @@
           <a:p>
             <a:fld id="{542F47FF-5056-41FF-A1F8-23A414798AA4}" type="datetimeFigureOut">
               <a:rPr lang="en-SG" smtClean="0"/>
-              <a:t>6/7/2018</a:t>
+              <a:t>17/10/18</a:t>
             </a:fld>
             <a:endParaRPr lang="en-SG"/>
           </a:p>
@@ -1151,7 +1147,7 @@
           <a:p>
             <a:fld id="{542F47FF-5056-41FF-A1F8-23A414798AA4}" type="datetimeFigureOut">
               <a:rPr lang="en-SG" smtClean="0"/>
-              <a:t>6/7/2018</a:t>
+              <a:t>17/10/18</a:t>
             </a:fld>
             <a:endParaRPr lang="en-SG"/>
           </a:p>
@@ -1419,7 +1415,7 @@
           <a:p>
             <a:fld id="{542F47FF-5056-41FF-A1F8-23A414798AA4}" type="datetimeFigureOut">
               <a:rPr lang="en-SG" smtClean="0"/>
-              <a:t>6/7/2018</a:t>
+              <a:t>17/10/18</a:t>
             </a:fld>
             <a:endParaRPr lang="en-SG"/>
           </a:p>
@@ -1834,7 +1830,7 @@
           <a:p>
             <a:fld id="{542F47FF-5056-41FF-A1F8-23A414798AA4}" type="datetimeFigureOut">
               <a:rPr lang="en-SG" smtClean="0"/>
-              <a:t>6/7/2018</a:t>
+              <a:t>17/10/18</a:t>
             </a:fld>
             <a:endParaRPr lang="en-SG"/>
           </a:p>
@@ -1976,7 +1972,7 @@
           <a:p>
             <a:fld id="{542F47FF-5056-41FF-A1F8-23A414798AA4}" type="datetimeFigureOut">
               <a:rPr lang="en-SG" smtClean="0"/>
-              <a:t>6/7/2018</a:t>
+              <a:t>17/10/18</a:t>
             </a:fld>
             <a:endParaRPr lang="en-SG"/>
           </a:p>
@@ -2089,7 +2085,7 @@
           <a:p>
             <a:fld id="{542F47FF-5056-41FF-A1F8-23A414798AA4}" type="datetimeFigureOut">
               <a:rPr lang="en-SG" smtClean="0"/>
-              <a:t>6/7/2018</a:t>
+              <a:t>17/10/18</a:t>
             </a:fld>
             <a:endParaRPr lang="en-SG"/>
           </a:p>
@@ -2402,7 +2398,7 @@
           <a:p>
             <a:fld id="{542F47FF-5056-41FF-A1F8-23A414798AA4}" type="datetimeFigureOut">
               <a:rPr lang="en-SG" smtClean="0"/>
-              <a:t>6/7/2018</a:t>
+              <a:t>17/10/18</a:t>
             </a:fld>
             <a:endParaRPr lang="en-SG"/>
           </a:p>
@@ -2691,7 +2687,7 @@
           <a:p>
             <a:fld id="{542F47FF-5056-41FF-A1F8-23A414798AA4}" type="datetimeFigureOut">
               <a:rPr lang="en-SG" smtClean="0"/>
-              <a:t>6/7/2018</a:t>
+              <a:t>17/10/18</a:t>
             </a:fld>
             <a:endParaRPr lang="en-SG"/>
           </a:p>
@@ -2934,7 +2930,7 @@
           <a:p>
             <a:fld id="{542F47FF-5056-41FF-A1F8-23A414798AA4}" type="datetimeFigureOut">
               <a:rPr lang="en-SG" smtClean="0"/>
-              <a:t>6/7/2018</a:t>
+              <a:t>17/10/18</a:t>
             </a:fld>
             <a:endParaRPr lang="en-SG"/>
           </a:p>
@@ -3636,8 +3632,8 @@
         </p:nvSpPr>
         <p:spPr>
           <a:xfrm>
-            <a:off x="4412106" y="2102568"/>
-            <a:ext cx="2066045" cy="646587"/>
+            <a:off x="4412106" y="2182578"/>
+            <a:ext cx="2066045" cy="553998"/>
           </a:xfrm>
           <a:prstGeom prst="rect">
             <a:avLst/>
@@ -3651,14 +3647,14 @@
           <a:lstStyle/>
           <a:p>
             <a:r>
-              <a:rPr lang="en-SG" sz="1801" dirty="0"/>
+              <a:rPr lang="en-SG" sz="1600" dirty="0"/>
               <a:t>[</a:t>
             </a:r>
             <a:r>
-              <a:rPr lang="en-US" dirty="0"/>
-              <a:t>command commits address book]</a:t>
-            </a:r>
-            <a:endParaRPr lang="en-SG" sz="1801" dirty="0"/>
+              <a:rPr lang="en-US" sz="1400" dirty="0"/>
+              <a:t>command commits previewImageManager]</a:t>
+            </a:r>
+            <a:endParaRPr lang="en-SG" sz="1600" dirty="0"/>
           </a:p>
         </p:txBody>
       </p:sp>
@@ -3708,16 +3704,8 @@
           <a:p>
             <a:pPr algn="ctr"/>
             <a:r>
-              <a:rPr lang="en-SG" sz="1801" dirty="0"/>
-              <a:t>Purge redundant states and then save address book to </a:t>
-            </a:r>
-            <a:r>
-              <a:rPr lang="en-SG" sz="1801" dirty="0" err="1"/>
-              <a:t>addressBookStateList</a:t>
-            </a:r>
-            <a:r>
-              <a:rPr lang="en-SG" sz="1801" dirty="0"/>
-              <a:t> </a:t>
+              <a:rPr lang="en-SG" sz="1400" dirty="0"/>
+              <a:t>Purge redundant states, then update the model’s previewImage by requesting for currentPreviewImageState</a:t>
             </a:r>
           </a:p>
         </p:txBody>

</xml_diff>

<commit_message>
Undo Diagram Redo: Rename AddressBook->TaskManager
</commit_message>
<xml_diff>
--- a/docs/diagrams/UndoRedoActivityDiagram.pptx
+++ b/docs/diagrams/UndoRedoActivityDiagram.pptx
@@ -138,7 +138,7 @@
           <p:cNvPr id="2" name="Title 1">
             <a:extLst>
               <a:ext uri="{FF2B5EF4-FFF2-40B4-BE49-F238E27FC236}">
-                <a16:creationId xmlns:a16="http://schemas.microsoft.com/office/drawing/2014/main" id="{CE1B3102-23FE-4A07-92CF-8DB8025B5C54}"/>
+                <a16:creationId xmlns:a16="http://schemas.microsoft.com/office/drawing/2014/main" xmlns="" id="{CE1B3102-23FE-4A07-92CF-8DB8025B5C54}"/>
               </a:ext>
             </a:extLst>
           </p:cNvPr>
@@ -176,7 +176,7 @@
           <p:cNvPr id="3" name="Subtitle 2">
             <a:extLst>
               <a:ext uri="{FF2B5EF4-FFF2-40B4-BE49-F238E27FC236}">
-                <a16:creationId xmlns:a16="http://schemas.microsoft.com/office/drawing/2014/main" id="{09A64644-374F-4763-B477-E75EED09E18A}"/>
+                <a16:creationId xmlns:a16="http://schemas.microsoft.com/office/drawing/2014/main" xmlns="" id="{09A64644-374F-4763-B477-E75EED09E18A}"/>
               </a:ext>
             </a:extLst>
           </p:cNvPr>
@@ -247,7 +247,7 @@
           <p:cNvPr id="4" name="Date Placeholder 3">
             <a:extLst>
               <a:ext uri="{FF2B5EF4-FFF2-40B4-BE49-F238E27FC236}">
-                <a16:creationId xmlns:a16="http://schemas.microsoft.com/office/drawing/2014/main" id="{26CAD04B-553E-4EE0-8FEC-DA9E05F22F2C}"/>
+                <a16:creationId xmlns:a16="http://schemas.microsoft.com/office/drawing/2014/main" xmlns="" id="{26CAD04B-553E-4EE0-8FEC-DA9E05F22F2C}"/>
               </a:ext>
             </a:extLst>
           </p:cNvPr>
@@ -265,7 +265,7 @@
           <a:p>
             <a:fld id="{542F47FF-5056-41FF-A1F8-23A414798AA4}" type="datetimeFigureOut">
               <a:rPr lang="en-SG" smtClean="0"/>
-              <a:t>6/7/2018</a:t>
+              <a:t>18/10/18</a:t>
             </a:fld>
             <a:endParaRPr lang="en-SG"/>
           </a:p>
@@ -276,7 +276,7 @@
           <p:cNvPr id="5" name="Footer Placeholder 4">
             <a:extLst>
               <a:ext uri="{FF2B5EF4-FFF2-40B4-BE49-F238E27FC236}">
-                <a16:creationId xmlns:a16="http://schemas.microsoft.com/office/drawing/2014/main" id="{E6F42670-2AD7-448C-BB6C-D759C9255DEB}"/>
+                <a16:creationId xmlns:a16="http://schemas.microsoft.com/office/drawing/2014/main" xmlns="" id="{E6F42670-2AD7-448C-BB6C-D759C9255DEB}"/>
               </a:ext>
             </a:extLst>
           </p:cNvPr>
@@ -301,7 +301,7 @@
           <p:cNvPr id="6" name="Slide Number Placeholder 5">
             <a:extLst>
               <a:ext uri="{FF2B5EF4-FFF2-40B4-BE49-F238E27FC236}">
-                <a16:creationId xmlns:a16="http://schemas.microsoft.com/office/drawing/2014/main" id="{8CFAA546-9089-42A6-8CCB-5E88855E6CB1}"/>
+                <a16:creationId xmlns:a16="http://schemas.microsoft.com/office/drawing/2014/main" xmlns="" id="{8CFAA546-9089-42A6-8CCB-5E88855E6CB1}"/>
               </a:ext>
             </a:extLst>
           </p:cNvPr>
@@ -360,7 +360,7 @@
           <p:cNvPr id="2" name="Title 1">
             <a:extLst>
               <a:ext uri="{FF2B5EF4-FFF2-40B4-BE49-F238E27FC236}">
-                <a16:creationId xmlns:a16="http://schemas.microsoft.com/office/drawing/2014/main" id="{C73C8897-08BA-4903-B8F2-48E6E6713059}"/>
+                <a16:creationId xmlns:a16="http://schemas.microsoft.com/office/drawing/2014/main" xmlns="" id="{C73C8897-08BA-4903-B8F2-48E6E6713059}"/>
               </a:ext>
             </a:extLst>
           </p:cNvPr>
@@ -389,7 +389,7 @@
           <p:cNvPr id="3" name="Vertical Text Placeholder 2">
             <a:extLst>
               <a:ext uri="{FF2B5EF4-FFF2-40B4-BE49-F238E27FC236}">
-                <a16:creationId xmlns:a16="http://schemas.microsoft.com/office/drawing/2014/main" id="{F4DB86F3-F3A8-4AC4-A2D0-18858F9E9EAF}"/>
+                <a16:creationId xmlns:a16="http://schemas.microsoft.com/office/drawing/2014/main" xmlns="" id="{F4DB86F3-F3A8-4AC4-A2D0-18858F9E9EAF}"/>
               </a:ext>
             </a:extLst>
           </p:cNvPr>
@@ -447,7 +447,7 @@
           <p:cNvPr id="4" name="Date Placeholder 3">
             <a:extLst>
               <a:ext uri="{FF2B5EF4-FFF2-40B4-BE49-F238E27FC236}">
-                <a16:creationId xmlns:a16="http://schemas.microsoft.com/office/drawing/2014/main" id="{22C4FC92-3E88-48DC-9327-19CD6A48E96D}"/>
+                <a16:creationId xmlns:a16="http://schemas.microsoft.com/office/drawing/2014/main" xmlns="" id="{22C4FC92-3E88-48DC-9327-19CD6A48E96D}"/>
               </a:ext>
             </a:extLst>
           </p:cNvPr>
@@ -465,7 +465,7 @@
           <a:p>
             <a:fld id="{542F47FF-5056-41FF-A1F8-23A414798AA4}" type="datetimeFigureOut">
               <a:rPr lang="en-SG" smtClean="0"/>
-              <a:t>6/7/2018</a:t>
+              <a:t>18/10/18</a:t>
             </a:fld>
             <a:endParaRPr lang="en-SG"/>
           </a:p>
@@ -476,7 +476,7 @@
           <p:cNvPr id="5" name="Footer Placeholder 4">
             <a:extLst>
               <a:ext uri="{FF2B5EF4-FFF2-40B4-BE49-F238E27FC236}">
-                <a16:creationId xmlns:a16="http://schemas.microsoft.com/office/drawing/2014/main" id="{AA190F3C-D185-4E17-A1B5-D7F4DF331BE0}"/>
+                <a16:creationId xmlns:a16="http://schemas.microsoft.com/office/drawing/2014/main" xmlns="" id="{AA190F3C-D185-4E17-A1B5-D7F4DF331BE0}"/>
               </a:ext>
             </a:extLst>
           </p:cNvPr>
@@ -501,7 +501,7 @@
           <p:cNvPr id="6" name="Slide Number Placeholder 5">
             <a:extLst>
               <a:ext uri="{FF2B5EF4-FFF2-40B4-BE49-F238E27FC236}">
-                <a16:creationId xmlns:a16="http://schemas.microsoft.com/office/drawing/2014/main" id="{0F2506F5-483C-4F84-8363-1D309E459ADD}"/>
+                <a16:creationId xmlns:a16="http://schemas.microsoft.com/office/drawing/2014/main" xmlns="" id="{0F2506F5-483C-4F84-8363-1D309E459ADD}"/>
               </a:ext>
             </a:extLst>
           </p:cNvPr>
@@ -560,7 +560,7 @@
           <p:cNvPr id="2" name="Vertical Title 1">
             <a:extLst>
               <a:ext uri="{FF2B5EF4-FFF2-40B4-BE49-F238E27FC236}">
-                <a16:creationId xmlns:a16="http://schemas.microsoft.com/office/drawing/2014/main" id="{967C03EB-4647-4E98-B84F-7651E807A990}"/>
+                <a16:creationId xmlns:a16="http://schemas.microsoft.com/office/drawing/2014/main" xmlns="" id="{967C03EB-4647-4E98-B84F-7651E807A990}"/>
               </a:ext>
             </a:extLst>
           </p:cNvPr>
@@ -594,7 +594,7 @@
           <p:cNvPr id="3" name="Vertical Text Placeholder 2">
             <a:extLst>
               <a:ext uri="{FF2B5EF4-FFF2-40B4-BE49-F238E27FC236}">
-                <a16:creationId xmlns:a16="http://schemas.microsoft.com/office/drawing/2014/main" id="{22B1D2A8-918A-4854-959C-EDA5D46D2D74}"/>
+                <a16:creationId xmlns:a16="http://schemas.microsoft.com/office/drawing/2014/main" xmlns="" id="{22B1D2A8-918A-4854-959C-EDA5D46D2D74}"/>
               </a:ext>
             </a:extLst>
           </p:cNvPr>
@@ -657,7 +657,7 @@
           <p:cNvPr id="4" name="Date Placeholder 3">
             <a:extLst>
               <a:ext uri="{FF2B5EF4-FFF2-40B4-BE49-F238E27FC236}">
-                <a16:creationId xmlns:a16="http://schemas.microsoft.com/office/drawing/2014/main" id="{3F77D3B6-616A-4D06-980E-5A7866F9BB49}"/>
+                <a16:creationId xmlns:a16="http://schemas.microsoft.com/office/drawing/2014/main" xmlns="" id="{3F77D3B6-616A-4D06-980E-5A7866F9BB49}"/>
               </a:ext>
             </a:extLst>
           </p:cNvPr>
@@ -675,7 +675,7 @@
           <a:p>
             <a:fld id="{542F47FF-5056-41FF-A1F8-23A414798AA4}" type="datetimeFigureOut">
               <a:rPr lang="en-SG" smtClean="0"/>
-              <a:t>6/7/2018</a:t>
+              <a:t>18/10/18</a:t>
             </a:fld>
             <a:endParaRPr lang="en-SG"/>
           </a:p>
@@ -686,7 +686,7 @@
           <p:cNvPr id="5" name="Footer Placeholder 4">
             <a:extLst>
               <a:ext uri="{FF2B5EF4-FFF2-40B4-BE49-F238E27FC236}">
-                <a16:creationId xmlns:a16="http://schemas.microsoft.com/office/drawing/2014/main" id="{20525AA2-4FD6-4C5E-B28C-2C71AF011737}"/>
+                <a16:creationId xmlns:a16="http://schemas.microsoft.com/office/drawing/2014/main" xmlns="" id="{20525AA2-4FD6-4C5E-B28C-2C71AF011737}"/>
               </a:ext>
             </a:extLst>
           </p:cNvPr>
@@ -711,7 +711,7 @@
           <p:cNvPr id="6" name="Slide Number Placeholder 5">
             <a:extLst>
               <a:ext uri="{FF2B5EF4-FFF2-40B4-BE49-F238E27FC236}">
-                <a16:creationId xmlns:a16="http://schemas.microsoft.com/office/drawing/2014/main" id="{4E040DF9-BA3F-440A-8819-8D374D74F15E}"/>
+                <a16:creationId xmlns:a16="http://schemas.microsoft.com/office/drawing/2014/main" xmlns="" id="{4E040DF9-BA3F-440A-8819-8D374D74F15E}"/>
               </a:ext>
             </a:extLst>
           </p:cNvPr>
@@ -770,7 +770,7 @@
           <p:cNvPr id="2" name="Title 1">
             <a:extLst>
               <a:ext uri="{FF2B5EF4-FFF2-40B4-BE49-F238E27FC236}">
-                <a16:creationId xmlns:a16="http://schemas.microsoft.com/office/drawing/2014/main" id="{75C804EA-614F-485C-A53F-C32B83B67A30}"/>
+                <a16:creationId xmlns:a16="http://schemas.microsoft.com/office/drawing/2014/main" xmlns="" id="{75C804EA-614F-485C-A53F-C32B83B67A30}"/>
               </a:ext>
             </a:extLst>
           </p:cNvPr>
@@ -799,7 +799,7 @@
           <p:cNvPr id="3" name="Content Placeholder 2">
             <a:extLst>
               <a:ext uri="{FF2B5EF4-FFF2-40B4-BE49-F238E27FC236}">
-                <a16:creationId xmlns:a16="http://schemas.microsoft.com/office/drawing/2014/main" id="{912A86A6-5554-4D2F-97BB-2D649E738506}"/>
+                <a16:creationId xmlns:a16="http://schemas.microsoft.com/office/drawing/2014/main" xmlns="" id="{912A86A6-5554-4D2F-97BB-2D649E738506}"/>
               </a:ext>
             </a:extLst>
           </p:cNvPr>
@@ -857,7 +857,7 @@
           <p:cNvPr id="4" name="Date Placeholder 3">
             <a:extLst>
               <a:ext uri="{FF2B5EF4-FFF2-40B4-BE49-F238E27FC236}">
-                <a16:creationId xmlns:a16="http://schemas.microsoft.com/office/drawing/2014/main" id="{69704FB4-4D28-4A39-B81F-407E0DDD475C}"/>
+                <a16:creationId xmlns:a16="http://schemas.microsoft.com/office/drawing/2014/main" xmlns="" id="{69704FB4-4D28-4A39-B81F-407E0DDD475C}"/>
               </a:ext>
             </a:extLst>
           </p:cNvPr>
@@ -875,7 +875,7 @@
           <a:p>
             <a:fld id="{542F47FF-5056-41FF-A1F8-23A414798AA4}" type="datetimeFigureOut">
               <a:rPr lang="en-SG" smtClean="0"/>
-              <a:t>6/7/2018</a:t>
+              <a:t>18/10/18</a:t>
             </a:fld>
             <a:endParaRPr lang="en-SG"/>
           </a:p>
@@ -886,7 +886,7 @@
           <p:cNvPr id="5" name="Footer Placeholder 4">
             <a:extLst>
               <a:ext uri="{FF2B5EF4-FFF2-40B4-BE49-F238E27FC236}">
-                <a16:creationId xmlns:a16="http://schemas.microsoft.com/office/drawing/2014/main" id="{AFDB90F4-6173-409D-8731-A4C292C33336}"/>
+                <a16:creationId xmlns:a16="http://schemas.microsoft.com/office/drawing/2014/main" xmlns="" id="{AFDB90F4-6173-409D-8731-A4C292C33336}"/>
               </a:ext>
             </a:extLst>
           </p:cNvPr>
@@ -911,7 +911,7 @@
           <p:cNvPr id="6" name="Slide Number Placeholder 5">
             <a:extLst>
               <a:ext uri="{FF2B5EF4-FFF2-40B4-BE49-F238E27FC236}">
-                <a16:creationId xmlns:a16="http://schemas.microsoft.com/office/drawing/2014/main" id="{0C00E245-E701-4B2E-925D-4322EFA20D66}"/>
+                <a16:creationId xmlns:a16="http://schemas.microsoft.com/office/drawing/2014/main" xmlns="" id="{0C00E245-E701-4B2E-925D-4322EFA20D66}"/>
               </a:ext>
             </a:extLst>
           </p:cNvPr>
@@ -970,7 +970,7 @@
           <p:cNvPr id="2" name="Title 1">
             <a:extLst>
               <a:ext uri="{FF2B5EF4-FFF2-40B4-BE49-F238E27FC236}">
-                <a16:creationId xmlns:a16="http://schemas.microsoft.com/office/drawing/2014/main" id="{2237510E-B988-4DCB-9C02-932F190AC101}"/>
+                <a16:creationId xmlns:a16="http://schemas.microsoft.com/office/drawing/2014/main" xmlns="" id="{2237510E-B988-4DCB-9C02-932F190AC101}"/>
               </a:ext>
             </a:extLst>
           </p:cNvPr>
@@ -1008,7 +1008,7 @@
           <p:cNvPr id="3" name="Text Placeholder 2">
             <a:extLst>
               <a:ext uri="{FF2B5EF4-FFF2-40B4-BE49-F238E27FC236}">
-                <a16:creationId xmlns:a16="http://schemas.microsoft.com/office/drawing/2014/main" id="{784A23DD-6E19-4939-A085-751F973752F5}"/>
+                <a16:creationId xmlns:a16="http://schemas.microsoft.com/office/drawing/2014/main" xmlns="" id="{784A23DD-6E19-4939-A085-751F973752F5}"/>
               </a:ext>
             </a:extLst>
           </p:cNvPr>
@@ -1133,7 +1133,7 @@
           <p:cNvPr id="4" name="Date Placeholder 3">
             <a:extLst>
               <a:ext uri="{FF2B5EF4-FFF2-40B4-BE49-F238E27FC236}">
-                <a16:creationId xmlns:a16="http://schemas.microsoft.com/office/drawing/2014/main" id="{CD5B15F4-A7B8-4D17-8C46-94AC6465D19A}"/>
+                <a16:creationId xmlns:a16="http://schemas.microsoft.com/office/drawing/2014/main" xmlns="" id="{CD5B15F4-A7B8-4D17-8C46-94AC6465D19A}"/>
               </a:ext>
             </a:extLst>
           </p:cNvPr>
@@ -1151,7 +1151,7 @@
           <a:p>
             <a:fld id="{542F47FF-5056-41FF-A1F8-23A414798AA4}" type="datetimeFigureOut">
               <a:rPr lang="en-SG" smtClean="0"/>
-              <a:t>6/7/2018</a:t>
+              <a:t>18/10/18</a:t>
             </a:fld>
             <a:endParaRPr lang="en-SG"/>
           </a:p>
@@ -1162,7 +1162,7 @@
           <p:cNvPr id="5" name="Footer Placeholder 4">
             <a:extLst>
               <a:ext uri="{FF2B5EF4-FFF2-40B4-BE49-F238E27FC236}">
-                <a16:creationId xmlns:a16="http://schemas.microsoft.com/office/drawing/2014/main" id="{0CC0B098-2820-40C0-8166-283BB17CD72D}"/>
+                <a16:creationId xmlns:a16="http://schemas.microsoft.com/office/drawing/2014/main" xmlns="" id="{0CC0B098-2820-40C0-8166-283BB17CD72D}"/>
               </a:ext>
             </a:extLst>
           </p:cNvPr>
@@ -1187,7 +1187,7 @@
           <p:cNvPr id="6" name="Slide Number Placeholder 5">
             <a:extLst>
               <a:ext uri="{FF2B5EF4-FFF2-40B4-BE49-F238E27FC236}">
-                <a16:creationId xmlns:a16="http://schemas.microsoft.com/office/drawing/2014/main" id="{CA1D6085-5297-4CE0-858B-F5A8477F21A1}"/>
+                <a16:creationId xmlns:a16="http://schemas.microsoft.com/office/drawing/2014/main" xmlns="" id="{CA1D6085-5297-4CE0-858B-F5A8477F21A1}"/>
               </a:ext>
             </a:extLst>
           </p:cNvPr>
@@ -1246,7 +1246,7 @@
           <p:cNvPr id="2" name="Title 1">
             <a:extLst>
               <a:ext uri="{FF2B5EF4-FFF2-40B4-BE49-F238E27FC236}">
-                <a16:creationId xmlns:a16="http://schemas.microsoft.com/office/drawing/2014/main" id="{C8312645-9305-4015-B5DF-8CD06CE54CD2}"/>
+                <a16:creationId xmlns:a16="http://schemas.microsoft.com/office/drawing/2014/main" xmlns="" id="{C8312645-9305-4015-B5DF-8CD06CE54CD2}"/>
               </a:ext>
             </a:extLst>
           </p:cNvPr>
@@ -1275,7 +1275,7 @@
           <p:cNvPr id="3" name="Content Placeholder 2">
             <a:extLst>
               <a:ext uri="{FF2B5EF4-FFF2-40B4-BE49-F238E27FC236}">
-                <a16:creationId xmlns:a16="http://schemas.microsoft.com/office/drawing/2014/main" id="{5F718F3D-23A6-4BAE-A195-9290BED99436}"/>
+                <a16:creationId xmlns:a16="http://schemas.microsoft.com/office/drawing/2014/main" xmlns="" id="{5F718F3D-23A6-4BAE-A195-9290BED99436}"/>
               </a:ext>
             </a:extLst>
           </p:cNvPr>
@@ -1338,7 +1338,7 @@
           <p:cNvPr id="4" name="Content Placeholder 3">
             <a:extLst>
               <a:ext uri="{FF2B5EF4-FFF2-40B4-BE49-F238E27FC236}">
-                <a16:creationId xmlns:a16="http://schemas.microsoft.com/office/drawing/2014/main" id="{987DE0C4-EF3A-42E6-9D3E-22C7A0BC9A37}"/>
+                <a16:creationId xmlns:a16="http://schemas.microsoft.com/office/drawing/2014/main" xmlns="" id="{987DE0C4-EF3A-42E6-9D3E-22C7A0BC9A37}"/>
               </a:ext>
             </a:extLst>
           </p:cNvPr>
@@ -1401,7 +1401,7 @@
           <p:cNvPr id="5" name="Date Placeholder 4">
             <a:extLst>
               <a:ext uri="{FF2B5EF4-FFF2-40B4-BE49-F238E27FC236}">
-                <a16:creationId xmlns:a16="http://schemas.microsoft.com/office/drawing/2014/main" id="{E4BFA167-4D74-44D4-AA06-F7DBEA7BB015}"/>
+                <a16:creationId xmlns:a16="http://schemas.microsoft.com/office/drawing/2014/main" xmlns="" id="{E4BFA167-4D74-44D4-AA06-F7DBEA7BB015}"/>
               </a:ext>
             </a:extLst>
           </p:cNvPr>
@@ -1419,7 +1419,7 @@
           <a:p>
             <a:fld id="{542F47FF-5056-41FF-A1F8-23A414798AA4}" type="datetimeFigureOut">
               <a:rPr lang="en-SG" smtClean="0"/>
-              <a:t>6/7/2018</a:t>
+              <a:t>18/10/18</a:t>
             </a:fld>
             <a:endParaRPr lang="en-SG"/>
           </a:p>
@@ -1430,7 +1430,7 @@
           <p:cNvPr id="6" name="Footer Placeholder 5">
             <a:extLst>
               <a:ext uri="{FF2B5EF4-FFF2-40B4-BE49-F238E27FC236}">
-                <a16:creationId xmlns:a16="http://schemas.microsoft.com/office/drawing/2014/main" id="{000F966C-5803-470B-AFA7-C187FB7AE76F}"/>
+                <a16:creationId xmlns:a16="http://schemas.microsoft.com/office/drawing/2014/main" xmlns="" id="{000F966C-5803-470B-AFA7-C187FB7AE76F}"/>
               </a:ext>
             </a:extLst>
           </p:cNvPr>
@@ -1455,7 +1455,7 @@
           <p:cNvPr id="7" name="Slide Number Placeholder 6">
             <a:extLst>
               <a:ext uri="{FF2B5EF4-FFF2-40B4-BE49-F238E27FC236}">
-                <a16:creationId xmlns:a16="http://schemas.microsoft.com/office/drawing/2014/main" id="{C5072683-17F0-489D-BA30-0EAE1A9786AE}"/>
+                <a16:creationId xmlns:a16="http://schemas.microsoft.com/office/drawing/2014/main" xmlns="" id="{C5072683-17F0-489D-BA30-0EAE1A9786AE}"/>
               </a:ext>
             </a:extLst>
           </p:cNvPr>
@@ -1514,7 +1514,7 @@
           <p:cNvPr id="2" name="Title 1">
             <a:extLst>
               <a:ext uri="{FF2B5EF4-FFF2-40B4-BE49-F238E27FC236}">
-                <a16:creationId xmlns:a16="http://schemas.microsoft.com/office/drawing/2014/main" id="{CEC7B897-F9D1-4F32-BB47-48174A5ED64C}"/>
+                <a16:creationId xmlns:a16="http://schemas.microsoft.com/office/drawing/2014/main" xmlns="" id="{CEC7B897-F9D1-4F32-BB47-48174A5ED64C}"/>
               </a:ext>
             </a:extLst>
           </p:cNvPr>
@@ -1548,7 +1548,7 @@
           <p:cNvPr id="3" name="Text Placeholder 2">
             <a:extLst>
               <a:ext uri="{FF2B5EF4-FFF2-40B4-BE49-F238E27FC236}">
-                <a16:creationId xmlns:a16="http://schemas.microsoft.com/office/drawing/2014/main" id="{F641612B-9729-43C6-B566-AD5088E65020}"/>
+                <a16:creationId xmlns:a16="http://schemas.microsoft.com/office/drawing/2014/main" xmlns="" id="{F641612B-9729-43C6-B566-AD5088E65020}"/>
               </a:ext>
             </a:extLst>
           </p:cNvPr>
@@ -1619,7 +1619,7 @@
           <p:cNvPr id="4" name="Content Placeholder 3">
             <a:extLst>
               <a:ext uri="{FF2B5EF4-FFF2-40B4-BE49-F238E27FC236}">
-                <a16:creationId xmlns:a16="http://schemas.microsoft.com/office/drawing/2014/main" id="{C9E1DDFB-755B-486A-8E6E-CC7CFE66970C}"/>
+                <a16:creationId xmlns:a16="http://schemas.microsoft.com/office/drawing/2014/main" xmlns="" id="{C9E1DDFB-755B-486A-8E6E-CC7CFE66970C}"/>
               </a:ext>
             </a:extLst>
           </p:cNvPr>
@@ -1682,7 +1682,7 @@
           <p:cNvPr id="5" name="Text Placeholder 4">
             <a:extLst>
               <a:ext uri="{FF2B5EF4-FFF2-40B4-BE49-F238E27FC236}">
-                <a16:creationId xmlns:a16="http://schemas.microsoft.com/office/drawing/2014/main" id="{9C513BAE-7453-4E00-A4D1-7192F85ACD26}"/>
+                <a16:creationId xmlns:a16="http://schemas.microsoft.com/office/drawing/2014/main" xmlns="" id="{9C513BAE-7453-4E00-A4D1-7192F85ACD26}"/>
               </a:ext>
             </a:extLst>
           </p:cNvPr>
@@ -1753,7 +1753,7 @@
           <p:cNvPr id="6" name="Content Placeholder 5">
             <a:extLst>
               <a:ext uri="{FF2B5EF4-FFF2-40B4-BE49-F238E27FC236}">
-                <a16:creationId xmlns:a16="http://schemas.microsoft.com/office/drawing/2014/main" id="{CD44104D-C0AE-4458-869E-DFF710C415CC}"/>
+                <a16:creationId xmlns:a16="http://schemas.microsoft.com/office/drawing/2014/main" xmlns="" id="{CD44104D-C0AE-4458-869E-DFF710C415CC}"/>
               </a:ext>
             </a:extLst>
           </p:cNvPr>
@@ -1816,7 +1816,7 @@
           <p:cNvPr id="7" name="Date Placeholder 6">
             <a:extLst>
               <a:ext uri="{FF2B5EF4-FFF2-40B4-BE49-F238E27FC236}">
-                <a16:creationId xmlns:a16="http://schemas.microsoft.com/office/drawing/2014/main" id="{4CB7CAF3-D690-40A3-88F7-9D0D17864C18}"/>
+                <a16:creationId xmlns:a16="http://schemas.microsoft.com/office/drawing/2014/main" xmlns="" id="{4CB7CAF3-D690-40A3-88F7-9D0D17864C18}"/>
               </a:ext>
             </a:extLst>
           </p:cNvPr>
@@ -1834,7 +1834,7 @@
           <a:p>
             <a:fld id="{542F47FF-5056-41FF-A1F8-23A414798AA4}" type="datetimeFigureOut">
               <a:rPr lang="en-SG" smtClean="0"/>
-              <a:t>6/7/2018</a:t>
+              <a:t>18/10/18</a:t>
             </a:fld>
             <a:endParaRPr lang="en-SG"/>
           </a:p>
@@ -1845,7 +1845,7 @@
           <p:cNvPr id="8" name="Footer Placeholder 7">
             <a:extLst>
               <a:ext uri="{FF2B5EF4-FFF2-40B4-BE49-F238E27FC236}">
-                <a16:creationId xmlns:a16="http://schemas.microsoft.com/office/drawing/2014/main" id="{E3FCCAB0-63DD-4704-AA42-E4F81E641DA3}"/>
+                <a16:creationId xmlns:a16="http://schemas.microsoft.com/office/drawing/2014/main" xmlns="" id="{E3FCCAB0-63DD-4704-AA42-E4F81E641DA3}"/>
               </a:ext>
             </a:extLst>
           </p:cNvPr>
@@ -1870,7 +1870,7 @@
           <p:cNvPr id="9" name="Slide Number Placeholder 8">
             <a:extLst>
               <a:ext uri="{FF2B5EF4-FFF2-40B4-BE49-F238E27FC236}">
-                <a16:creationId xmlns:a16="http://schemas.microsoft.com/office/drawing/2014/main" id="{604EFCC3-8687-4BC3-9C9E-60FD561B237F}"/>
+                <a16:creationId xmlns:a16="http://schemas.microsoft.com/office/drawing/2014/main" xmlns="" id="{604EFCC3-8687-4BC3-9C9E-60FD561B237F}"/>
               </a:ext>
             </a:extLst>
           </p:cNvPr>
@@ -1929,7 +1929,7 @@
           <p:cNvPr id="2" name="Title 1">
             <a:extLst>
               <a:ext uri="{FF2B5EF4-FFF2-40B4-BE49-F238E27FC236}">
-                <a16:creationId xmlns:a16="http://schemas.microsoft.com/office/drawing/2014/main" id="{D324AE97-E2C9-4642-887A-4474C5566AA6}"/>
+                <a16:creationId xmlns:a16="http://schemas.microsoft.com/office/drawing/2014/main" xmlns="" id="{D324AE97-E2C9-4642-887A-4474C5566AA6}"/>
               </a:ext>
             </a:extLst>
           </p:cNvPr>
@@ -1958,7 +1958,7 @@
           <p:cNvPr id="3" name="Date Placeholder 2">
             <a:extLst>
               <a:ext uri="{FF2B5EF4-FFF2-40B4-BE49-F238E27FC236}">
-                <a16:creationId xmlns:a16="http://schemas.microsoft.com/office/drawing/2014/main" id="{919EDCEA-D8A9-431E-AF93-4824C03FD0F2}"/>
+                <a16:creationId xmlns:a16="http://schemas.microsoft.com/office/drawing/2014/main" xmlns="" id="{919EDCEA-D8A9-431E-AF93-4824C03FD0F2}"/>
               </a:ext>
             </a:extLst>
           </p:cNvPr>
@@ -1976,7 +1976,7 @@
           <a:p>
             <a:fld id="{542F47FF-5056-41FF-A1F8-23A414798AA4}" type="datetimeFigureOut">
               <a:rPr lang="en-SG" smtClean="0"/>
-              <a:t>6/7/2018</a:t>
+              <a:t>18/10/18</a:t>
             </a:fld>
             <a:endParaRPr lang="en-SG"/>
           </a:p>
@@ -1987,7 +1987,7 @@
           <p:cNvPr id="4" name="Footer Placeholder 3">
             <a:extLst>
               <a:ext uri="{FF2B5EF4-FFF2-40B4-BE49-F238E27FC236}">
-                <a16:creationId xmlns:a16="http://schemas.microsoft.com/office/drawing/2014/main" id="{1F13DD51-16D3-435A-A475-0C2A7255A05E}"/>
+                <a16:creationId xmlns:a16="http://schemas.microsoft.com/office/drawing/2014/main" xmlns="" id="{1F13DD51-16D3-435A-A475-0C2A7255A05E}"/>
               </a:ext>
             </a:extLst>
           </p:cNvPr>
@@ -2012,7 +2012,7 @@
           <p:cNvPr id="5" name="Slide Number Placeholder 4">
             <a:extLst>
               <a:ext uri="{FF2B5EF4-FFF2-40B4-BE49-F238E27FC236}">
-                <a16:creationId xmlns:a16="http://schemas.microsoft.com/office/drawing/2014/main" id="{3D7AC15F-BADE-4466-835A-57B1A9E5162B}"/>
+                <a16:creationId xmlns:a16="http://schemas.microsoft.com/office/drawing/2014/main" xmlns="" id="{3D7AC15F-BADE-4466-835A-57B1A9E5162B}"/>
               </a:ext>
             </a:extLst>
           </p:cNvPr>
@@ -2071,7 +2071,7 @@
           <p:cNvPr id="2" name="Date Placeholder 1">
             <a:extLst>
               <a:ext uri="{FF2B5EF4-FFF2-40B4-BE49-F238E27FC236}">
-                <a16:creationId xmlns:a16="http://schemas.microsoft.com/office/drawing/2014/main" id="{48F01CC8-EEC4-4B3C-8C73-3EBB7DCEBE67}"/>
+                <a16:creationId xmlns:a16="http://schemas.microsoft.com/office/drawing/2014/main" xmlns="" id="{48F01CC8-EEC4-4B3C-8C73-3EBB7DCEBE67}"/>
               </a:ext>
             </a:extLst>
           </p:cNvPr>
@@ -2089,7 +2089,7 @@
           <a:p>
             <a:fld id="{542F47FF-5056-41FF-A1F8-23A414798AA4}" type="datetimeFigureOut">
               <a:rPr lang="en-SG" smtClean="0"/>
-              <a:t>6/7/2018</a:t>
+              <a:t>18/10/18</a:t>
             </a:fld>
             <a:endParaRPr lang="en-SG"/>
           </a:p>
@@ -2100,7 +2100,7 @@
           <p:cNvPr id="3" name="Footer Placeholder 2">
             <a:extLst>
               <a:ext uri="{FF2B5EF4-FFF2-40B4-BE49-F238E27FC236}">
-                <a16:creationId xmlns:a16="http://schemas.microsoft.com/office/drawing/2014/main" id="{4D820BAF-6E28-43DA-9E9B-8C229AB2A964}"/>
+                <a16:creationId xmlns:a16="http://schemas.microsoft.com/office/drawing/2014/main" xmlns="" id="{4D820BAF-6E28-43DA-9E9B-8C229AB2A964}"/>
               </a:ext>
             </a:extLst>
           </p:cNvPr>
@@ -2125,7 +2125,7 @@
           <p:cNvPr id="4" name="Slide Number Placeholder 3">
             <a:extLst>
               <a:ext uri="{FF2B5EF4-FFF2-40B4-BE49-F238E27FC236}">
-                <a16:creationId xmlns:a16="http://schemas.microsoft.com/office/drawing/2014/main" id="{49BFE3EF-B472-4F66-80D5-1B722E8086E6}"/>
+                <a16:creationId xmlns:a16="http://schemas.microsoft.com/office/drawing/2014/main" xmlns="" id="{49BFE3EF-B472-4F66-80D5-1B722E8086E6}"/>
               </a:ext>
             </a:extLst>
           </p:cNvPr>
@@ -2184,7 +2184,7 @@
           <p:cNvPr id="2" name="Title 1">
             <a:extLst>
               <a:ext uri="{FF2B5EF4-FFF2-40B4-BE49-F238E27FC236}">
-                <a16:creationId xmlns:a16="http://schemas.microsoft.com/office/drawing/2014/main" id="{E1ABDE73-0F58-47D3-8C8B-C147DE1C0B22}"/>
+                <a16:creationId xmlns:a16="http://schemas.microsoft.com/office/drawing/2014/main" xmlns="" id="{E1ABDE73-0F58-47D3-8C8B-C147DE1C0B22}"/>
               </a:ext>
             </a:extLst>
           </p:cNvPr>
@@ -2222,7 +2222,7 @@
           <p:cNvPr id="3" name="Content Placeholder 2">
             <a:extLst>
               <a:ext uri="{FF2B5EF4-FFF2-40B4-BE49-F238E27FC236}">
-                <a16:creationId xmlns:a16="http://schemas.microsoft.com/office/drawing/2014/main" id="{0167F6A8-B979-42A6-B421-40577DD5582F}"/>
+                <a16:creationId xmlns:a16="http://schemas.microsoft.com/office/drawing/2014/main" xmlns="" id="{0167F6A8-B979-42A6-B421-40577DD5582F}"/>
               </a:ext>
             </a:extLst>
           </p:cNvPr>
@@ -2313,7 +2313,7 @@
           <p:cNvPr id="4" name="Text Placeholder 3">
             <a:extLst>
               <a:ext uri="{FF2B5EF4-FFF2-40B4-BE49-F238E27FC236}">
-                <a16:creationId xmlns:a16="http://schemas.microsoft.com/office/drawing/2014/main" id="{6887A488-06FE-46E9-8AC5-DF38A61CCF05}"/>
+                <a16:creationId xmlns:a16="http://schemas.microsoft.com/office/drawing/2014/main" xmlns="" id="{6887A488-06FE-46E9-8AC5-DF38A61CCF05}"/>
               </a:ext>
             </a:extLst>
           </p:cNvPr>
@@ -2384,7 +2384,7 @@
           <p:cNvPr id="5" name="Date Placeholder 4">
             <a:extLst>
               <a:ext uri="{FF2B5EF4-FFF2-40B4-BE49-F238E27FC236}">
-                <a16:creationId xmlns:a16="http://schemas.microsoft.com/office/drawing/2014/main" id="{1225C56B-78B2-45C0-A8A9-C9D435A286D0}"/>
+                <a16:creationId xmlns:a16="http://schemas.microsoft.com/office/drawing/2014/main" xmlns="" id="{1225C56B-78B2-45C0-A8A9-C9D435A286D0}"/>
               </a:ext>
             </a:extLst>
           </p:cNvPr>
@@ -2402,7 +2402,7 @@
           <a:p>
             <a:fld id="{542F47FF-5056-41FF-A1F8-23A414798AA4}" type="datetimeFigureOut">
               <a:rPr lang="en-SG" smtClean="0"/>
-              <a:t>6/7/2018</a:t>
+              <a:t>18/10/18</a:t>
             </a:fld>
             <a:endParaRPr lang="en-SG"/>
           </a:p>
@@ -2413,7 +2413,7 @@
           <p:cNvPr id="6" name="Footer Placeholder 5">
             <a:extLst>
               <a:ext uri="{FF2B5EF4-FFF2-40B4-BE49-F238E27FC236}">
-                <a16:creationId xmlns:a16="http://schemas.microsoft.com/office/drawing/2014/main" id="{3F9E1B9E-B673-4E26-9323-D731DC395F9C}"/>
+                <a16:creationId xmlns:a16="http://schemas.microsoft.com/office/drawing/2014/main" xmlns="" id="{3F9E1B9E-B673-4E26-9323-D731DC395F9C}"/>
               </a:ext>
             </a:extLst>
           </p:cNvPr>
@@ -2438,7 +2438,7 @@
           <p:cNvPr id="7" name="Slide Number Placeholder 6">
             <a:extLst>
               <a:ext uri="{FF2B5EF4-FFF2-40B4-BE49-F238E27FC236}">
-                <a16:creationId xmlns:a16="http://schemas.microsoft.com/office/drawing/2014/main" id="{6633AB4A-8EB3-4154-869B-5580DEDF4F79}"/>
+                <a16:creationId xmlns:a16="http://schemas.microsoft.com/office/drawing/2014/main" xmlns="" id="{6633AB4A-8EB3-4154-869B-5580DEDF4F79}"/>
               </a:ext>
             </a:extLst>
           </p:cNvPr>
@@ -2497,7 +2497,7 @@
           <p:cNvPr id="2" name="Title 1">
             <a:extLst>
               <a:ext uri="{FF2B5EF4-FFF2-40B4-BE49-F238E27FC236}">
-                <a16:creationId xmlns:a16="http://schemas.microsoft.com/office/drawing/2014/main" id="{61D5430E-44A7-4B67-9F34-F532D5533356}"/>
+                <a16:creationId xmlns:a16="http://schemas.microsoft.com/office/drawing/2014/main" xmlns="" id="{61D5430E-44A7-4B67-9F34-F532D5533356}"/>
               </a:ext>
             </a:extLst>
           </p:cNvPr>
@@ -2535,7 +2535,7 @@
           <p:cNvPr id="3" name="Picture Placeholder 2">
             <a:extLst>
               <a:ext uri="{FF2B5EF4-FFF2-40B4-BE49-F238E27FC236}">
-                <a16:creationId xmlns:a16="http://schemas.microsoft.com/office/drawing/2014/main" id="{94374BCC-AC4A-4ED0-A7BD-6B2491EAED7E}"/>
+                <a16:creationId xmlns:a16="http://schemas.microsoft.com/office/drawing/2014/main" xmlns="" id="{94374BCC-AC4A-4ED0-A7BD-6B2491EAED7E}"/>
               </a:ext>
             </a:extLst>
           </p:cNvPr>
@@ -2602,7 +2602,7 @@
           <p:cNvPr id="4" name="Text Placeholder 3">
             <a:extLst>
               <a:ext uri="{FF2B5EF4-FFF2-40B4-BE49-F238E27FC236}">
-                <a16:creationId xmlns:a16="http://schemas.microsoft.com/office/drawing/2014/main" id="{5AD4568E-164B-462E-9285-49B735DD9DE7}"/>
+                <a16:creationId xmlns:a16="http://schemas.microsoft.com/office/drawing/2014/main" xmlns="" id="{5AD4568E-164B-462E-9285-49B735DD9DE7}"/>
               </a:ext>
             </a:extLst>
           </p:cNvPr>
@@ -2673,7 +2673,7 @@
           <p:cNvPr id="5" name="Date Placeholder 4">
             <a:extLst>
               <a:ext uri="{FF2B5EF4-FFF2-40B4-BE49-F238E27FC236}">
-                <a16:creationId xmlns:a16="http://schemas.microsoft.com/office/drawing/2014/main" id="{ABD88AB5-C9D0-4013-85B4-2228545F24AD}"/>
+                <a16:creationId xmlns:a16="http://schemas.microsoft.com/office/drawing/2014/main" xmlns="" id="{ABD88AB5-C9D0-4013-85B4-2228545F24AD}"/>
               </a:ext>
             </a:extLst>
           </p:cNvPr>
@@ -2691,7 +2691,7 @@
           <a:p>
             <a:fld id="{542F47FF-5056-41FF-A1F8-23A414798AA4}" type="datetimeFigureOut">
               <a:rPr lang="en-SG" smtClean="0"/>
-              <a:t>6/7/2018</a:t>
+              <a:t>18/10/18</a:t>
             </a:fld>
             <a:endParaRPr lang="en-SG"/>
           </a:p>
@@ -2702,7 +2702,7 @@
           <p:cNvPr id="6" name="Footer Placeholder 5">
             <a:extLst>
               <a:ext uri="{FF2B5EF4-FFF2-40B4-BE49-F238E27FC236}">
-                <a16:creationId xmlns:a16="http://schemas.microsoft.com/office/drawing/2014/main" id="{6378A798-E2A6-4417-A003-DE553E8EC325}"/>
+                <a16:creationId xmlns:a16="http://schemas.microsoft.com/office/drawing/2014/main" xmlns="" id="{6378A798-E2A6-4417-A003-DE553E8EC325}"/>
               </a:ext>
             </a:extLst>
           </p:cNvPr>
@@ -2727,7 +2727,7 @@
           <p:cNvPr id="7" name="Slide Number Placeholder 6">
             <a:extLst>
               <a:ext uri="{FF2B5EF4-FFF2-40B4-BE49-F238E27FC236}">
-                <a16:creationId xmlns:a16="http://schemas.microsoft.com/office/drawing/2014/main" id="{7BC6852D-C345-455C-9499-B57AE4D2D943}"/>
+                <a16:creationId xmlns:a16="http://schemas.microsoft.com/office/drawing/2014/main" xmlns="" id="{7BC6852D-C345-455C-9499-B57AE4D2D943}"/>
               </a:ext>
             </a:extLst>
           </p:cNvPr>
@@ -2791,7 +2791,7 @@
           <p:cNvPr id="2" name="Title Placeholder 1">
             <a:extLst>
               <a:ext uri="{FF2B5EF4-FFF2-40B4-BE49-F238E27FC236}">
-                <a16:creationId xmlns:a16="http://schemas.microsoft.com/office/drawing/2014/main" id="{CF097353-E272-4974-B34C-369C28928CA1}"/>
+                <a16:creationId xmlns:a16="http://schemas.microsoft.com/office/drawing/2014/main" xmlns="" id="{CF097353-E272-4974-B34C-369C28928CA1}"/>
               </a:ext>
             </a:extLst>
           </p:cNvPr>
@@ -2830,7 +2830,7 @@
           <p:cNvPr id="3" name="Text Placeholder 2">
             <a:extLst>
               <a:ext uri="{FF2B5EF4-FFF2-40B4-BE49-F238E27FC236}">
-                <a16:creationId xmlns:a16="http://schemas.microsoft.com/office/drawing/2014/main" id="{BB1BE290-84C1-4415-A557-1ACC36D1226C}"/>
+                <a16:creationId xmlns:a16="http://schemas.microsoft.com/office/drawing/2014/main" xmlns="" id="{BB1BE290-84C1-4415-A557-1ACC36D1226C}"/>
               </a:ext>
             </a:extLst>
           </p:cNvPr>
@@ -2898,7 +2898,7 @@
           <p:cNvPr id="4" name="Date Placeholder 3">
             <a:extLst>
               <a:ext uri="{FF2B5EF4-FFF2-40B4-BE49-F238E27FC236}">
-                <a16:creationId xmlns:a16="http://schemas.microsoft.com/office/drawing/2014/main" id="{F7EAAB47-96EA-44D5-8293-0D696F52A395}"/>
+                <a16:creationId xmlns:a16="http://schemas.microsoft.com/office/drawing/2014/main" xmlns="" id="{F7EAAB47-96EA-44D5-8293-0D696F52A395}"/>
               </a:ext>
             </a:extLst>
           </p:cNvPr>
@@ -2934,7 +2934,7 @@
           <a:p>
             <a:fld id="{542F47FF-5056-41FF-A1F8-23A414798AA4}" type="datetimeFigureOut">
               <a:rPr lang="en-SG" smtClean="0"/>
-              <a:t>6/7/2018</a:t>
+              <a:t>18/10/18</a:t>
             </a:fld>
             <a:endParaRPr lang="en-SG"/>
           </a:p>
@@ -2945,7 +2945,7 @@
           <p:cNvPr id="5" name="Footer Placeholder 4">
             <a:extLst>
               <a:ext uri="{FF2B5EF4-FFF2-40B4-BE49-F238E27FC236}">
-                <a16:creationId xmlns:a16="http://schemas.microsoft.com/office/drawing/2014/main" id="{F21C6E84-C98D-4391-98A0-E77A4221131C}"/>
+                <a16:creationId xmlns:a16="http://schemas.microsoft.com/office/drawing/2014/main" xmlns="" id="{F21C6E84-C98D-4391-98A0-E77A4221131C}"/>
               </a:ext>
             </a:extLst>
           </p:cNvPr>
@@ -2988,7 +2988,7 @@
           <p:cNvPr id="6" name="Slide Number Placeholder 5">
             <a:extLst>
               <a:ext uri="{FF2B5EF4-FFF2-40B4-BE49-F238E27FC236}">
-                <a16:creationId xmlns:a16="http://schemas.microsoft.com/office/drawing/2014/main" id="{FB352E9C-7394-48E0-A08D-56390F6520E1}"/>
+                <a16:creationId xmlns:a16="http://schemas.microsoft.com/office/drawing/2014/main" xmlns="" id="{FB352E9C-7394-48E0-A08D-56390F6520E1}"/>
               </a:ext>
             </a:extLst>
           </p:cNvPr>
@@ -3356,7 +3356,7 @@
           <p:cNvPr id="4" name="Oval 3">
             <a:extLst>
               <a:ext uri="{FF2B5EF4-FFF2-40B4-BE49-F238E27FC236}">
-                <a16:creationId xmlns:a16="http://schemas.microsoft.com/office/drawing/2014/main" id="{D45F487B-A914-4C8E-B564-00C9D621567D}"/>
+                <a16:creationId xmlns:a16="http://schemas.microsoft.com/office/drawing/2014/main" xmlns="" id="{D45F487B-A914-4C8E-B564-00C9D621567D}"/>
               </a:ext>
             </a:extLst>
           </p:cNvPr>
@@ -3405,7 +3405,7 @@
           <p:cNvPr id="6" name="Straight Arrow Connector 5">
             <a:extLst>
               <a:ext uri="{FF2B5EF4-FFF2-40B4-BE49-F238E27FC236}">
-                <a16:creationId xmlns:a16="http://schemas.microsoft.com/office/drawing/2014/main" id="{73D6638D-34B0-4D9A-B7DC-62ABF1C7D407}"/>
+                <a16:creationId xmlns:a16="http://schemas.microsoft.com/office/drawing/2014/main" xmlns="" id="{73D6638D-34B0-4D9A-B7DC-62ABF1C7D407}"/>
               </a:ext>
             </a:extLst>
           </p:cNvPr>
@@ -3448,7 +3448,7 @@
           <p:cNvPr id="8" name="Rectangle: Rounded Corners 7">
             <a:extLst>
               <a:ext uri="{FF2B5EF4-FFF2-40B4-BE49-F238E27FC236}">
-                <a16:creationId xmlns:a16="http://schemas.microsoft.com/office/drawing/2014/main" id="{C13E6F3C-30CD-49FB-94D8-AF011F54E935}"/>
+                <a16:creationId xmlns:a16="http://schemas.microsoft.com/office/drawing/2014/main" xmlns="" id="{C13E6F3C-30CD-49FB-94D8-AF011F54E935}"/>
               </a:ext>
             </a:extLst>
           </p:cNvPr>
@@ -3500,7 +3500,7 @@
           <p:cNvPr id="9" name="Straight Arrow Connector 8">
             <a:extLst>
               <a:ext uri="{FF2B5EF4-FFF2-40B4-BE49-F238E27FC236}">
-                <a16:creationId xmlns:a16="http://schemas.microsoft.com/office/drawing/2014/main" id="{6A0B3198-7B18-417D-A041-B13DF5BAE7A6}"/>
+                <a16:creationId xmlns:a16="http://schemas.microsoft.com/office/drawing/2014/main" xmlns="" id="{6A0B3198-7B18-417D-A041-B13DF5BAE7A6}"/>
               </a:ext>
             </a:extLst>
           </p:cNvPr>
@@ -3543,7 +3543,7 @@
           <p:cNvPr id="46" name="Diamond 45">
             <a:extLst>
               <a:ext uri="{FF2B5EF4-FFF2-40B4-BE49-F238E27FC236}">
-                <a16:creationId xmlns:a16="http://schemas.microsoft.com/office/drawing/2014/main" id="{FDB4A38F-F816-4320-82EB-071E9BA2EFAB}"/>
+                <a16:creationId xmlns:a16="http://schemas.microsoft.com/office/drawing/2014/main" xmlns="" id="{FDB4A38F-F816-4320-82EB-071E9BA2EFAB}"/>
               </a:ext>
             </a:extLst>
           </p:cNvPr>
@@ -3592,7 +3592,7 @@
           <p:cNvPr id="47" name="TextBox 46">
             <a:extLst>
               <a:ext uri="{FF2B5EF4-FFF2-40B4-BE49-F238E27FC236}">
-                <a16:creationId xmlns:a16="http://schemas.microsoft.com/office/drawing/2014/main" id="{791A7435-1CBD-4D64-B373-CDF617409EFD}"/>
+                <a16:creationId xmlns:a16="http://schemas.microsoft.com/office/drawing/2014/main" xmlns="" id="{791A7435-1CBD-4D64-B373-CDF617409EFD}"/>
               </a:ext>
             </a:extLst>
           </p:cNvPr>
@@ -3627,7 +3627,7 @@
           <p:cNvPr id="48" name="TextBox 47">
             <a:extLst>
               <a:ext uri="{FF2B5EF4-FFF2-40B4-BE49-F238E27FC236}">
-                <a16:creationId xmlns:a16="http://schemas.microsoft.com/office/drawing/2014/main" id="{300470AD-DA4C-4F16-91F5-E3E560CDBEFC}"/>
+                <a16:creationId xmlns:a16="http://schemas.microsoft.com/office/drawing/2014/main" xmlns="" id="{300470AD-DA4C-4F16-91F5-E3E560CDBEFC}"/>
               </a:ext>
             </a:extLst>
           </p:cNvPr>
@@ -3656,7 +3656,11 @@
             </a:r>
             <a:r>
               <a:rPr lang="en-US" dirty="0"/>
-              <a:t>command commits address book]</a:t>
+              <a:t>command commits </a:t>
+            </a:r>
+            <a:r>
+              <a:rPr lang="en-US" dirty="0" smtClean="0"/>
+              <a:t>task manager]</a:t>
             </a:r>
             <a:endParaRPr lang="en-SG" sz="1801" dirty="0"/>
           </a:p>
@@ -3667,7 +3671,7 @@
           <p:cNvPr id="51" name="Rectangle: Rounded Corners 50">
             <a:extLst>
               <a:ext uri="{FF2B5EF4-FFF2-40B4-BE49-F238E27FC236}">
-                <a16:creationId xmlns:a16="http://schemas.microsoft.com/office/drawing/2014/main" id="{D62D81FC-C644-4602-90C8-B7974D14CA54}"/>
+                <a16:creationId xmlns:a16="http://schemas.microsoft.com/office/drawing/2014/main" xmlns="" id="{D62D81FC-C644-4602-90C8-B7974D14CA54}"/>
               </a:ext>
             </a:extLst>
           </p:cNvPr>
@@ -3709,16 +3713,25 @@
             <a:pPr algn="ctr"/>
             <a:r>
               <a:rPr lang="en-SG" sz="1801" dirty="0"/>
-              <a:t>Purge redundant states and then save address book to </a:t>
-            </a:r>
-            <a:r>
-              <a:rPr lang="en-SG" sz="1801" dirty="0" err="1"/>
-              <a:t>addressBookStateList</a:t>
-            </a:r>
-            <a:r>
-              <a:rPr lang="en-SG" sz="1801" dirty="0"/>
+              <a:t>Purge redundant states and then save </a:t>
+            </a:r>
+            <a:r>
+              <a:rPr lang="en-SG" sz="1801" dirty="0" smtClean="0"/>
+              <a:t>task manager </a:t>
+            </a:r>
+            <a:r>
+              <a:rPr lang="en-SG" sz="1801" dirty="0" smtClean="0"/>
+              <a:t>to </a:t>
+            </a:r>
+            <a:r>
+              <a:rPr lang="en-SG" sz="1801" dirty="0" err="1" smtClean="0"/>
+              <a:t>taskManagerStateList</a:t>
+            </a:r>
+            <a:r>
+              <a:rPr lang="en-SG" sz="1801" dirty="0" smtClean="0"/>
               <a:t> </a:t>
             </a:r>
+            <a:endParaRPr lang="en-SG" sz="1801" dirty="0"/>
           </a:p>
         </p:txBody>
       </p:sp>
@@ -3727,7 +3740,7 @@
           <p:cNvPr id="56" name="Diamond 55">
             <a:extLst>
               <a:ext uri="{FF2B5EF4-FFF2-40B4-BE49-F238E27FC236}">
-                <a16:creationId xmlns:a16="http://schemas.microsoft.com/office/drawing/2014/main" id="{0ACD7DC4-F31E-42B2-9D34-41B1AE997EB1}"/>
+                <a16:creationId xmlns:a16="http://schemas.microsoft.com/office/drawing/2014/main" xmlns="" id="{0ACD7DC4-F31E-42B2-9D34-41B1AE997EB1}"/>
               </a:ext>
             </a:extLst>
           </p:cNvPr>
@@ -3776,7 +3789,7 @@
           <p:cNvPr id="69" name="Straight Arrow Connector 68">
             <a:extLst>
               <a:ext uri="{FF2B5EF4-FFF2-40B4-BE49-F238E27FC236}">
-                <a16:creationId xmlns:a16="http://schemas.microsoft.com/office/drawing/2014/main" id="{7BE2639B-14BA-4C9C-9964-899CEF3278C9}"/>
+                <a16:creationId xmlns:a16="http://schemas.microsoft.com/office/drawing/2014/main" xmlns="" id="{7BE2639B-14BA-4C9C-9964-899CEF3278C9}"/>
               </a:ext>
             </a:extLst>
           </p:cNvPr>
@@ -3819,7 +3832,7 @@
           <p:cNvPr id="75" name="Group 74">
             <a:extLst>
               <a:ext uri="{FF2B5EF4-FFF2-40B4-BE49-F238E27FC236}">
-                <a16:creationId xmlns:a16="http://schemas.microsoft.com/office/drawing/2014/main" id="{A48F4168-7D41-4ED6-97F1-58289DDE3C4D}"/>
+                <a16:creationId xmlns:a16="http://schemas.microsoft.com/office/drawing/2014/main" xmlns="" id="{A48F4168-7D41-4ED6-97F1-58289DDE3C4D}"/>
               </a:ext>
             </a:extLst>
           </p:cNvPr>
@@ -3839,7 +3852,7 @@
             <p:cNvPr id="68" name="Oval 67">
               <a:extLst>
                 <a:ext uri="{FF2B5EF4-FFF2-40B4-BE49-F238E27FC236}">
-                  <a16:creationId xmlns:a16="http://schemas.microsoft.com/office/drawing/2014/main" id="{E423C8D7-553D-4A16-BA68-78DB113CAEC3}"/>
+                  <a16:creationId xmlns:a16="http://schemas.microsoft.com/office/drawing/2014/main" xmlns="" id="{E423C8D7-553D-4A16-BA68-78DB113CAEC3}"/>
                 </a:ext>
               </a:extLst>
             </p:cNvPr>
@@ -3891,7 +3904,7 @@
             <p:cNvPr id="71" name="Oval 70">
               <a:extLst>
                 <a:ext uri="{FF2B5EF4-FFF2-40B4-BE49-F238E27FC236}">
-                  <a16:creationId xmlns:a16="http://schemas.microsoft.com/office/drawing/2014/main" id="{1F41AA13-1BFC-498E-BBC4-DC32053E38E1}"/>
+                  <a16:creationId xmlns:a16="http://schemas.microsoft.com/office/drawing/2014/main" xmlns="" id="{1F41AA13-1BFC-498E-BBC4-DC32053E38E1}"/>
                 </a:ext>
               </a:extLst>
             </p:cNvPr>

</xml_diff>

<commit_message>
- Update docs/diagrams/UndoRedoActivityDiagram.pptx - Update docs/images/UndoRedoActivityDiagram.png
</commit_message>
<xml_diff>
--- a/docs/diagrams/UndoRedoActivityDiagram.pptx
+++ b/docs/diagrams/UndoRedoActivityDiagram.pptx
@@ -112,10 +112,6 @@
 </p:presentation>
 </file>
 
-<file path=ppt/revisionInfo.xml><?xml version="1.0" encoding="utf-8"?>
-<p1510:revInfo xmlns:a="http://schemas.openxmlformats.org/drawingml/2006/main" xmlns:r="http://schemas.openxmlformats.org/officeDocument/2006/relationships" xmlns:p1510="http://schemas.microsoft.com/office/powerpoint/2015/10/main"/>
-</file>
-
 <file path=ppt/slideLayouts/slideLayout1.xml><?xml version="1.0" encoding="utf-8"?>
 <p:sldLayout xmlns:a="http://schemas.openxmlformats.org/drawingml/2006/main" xmlns:r="http://schemas.openxmlformats.org/officeDocument/2006/relationships" xmlns:p="http://schemas.openxmlformats.org/presentationml/2006/main" type="title" preserve="1">
   <p:cSld name="Title Slide">
@@ -265,7 +261,7 @@
           <a:p>
             <a:fld id="{542F47FF-5056-41FF-A1F8-23A414798AA4}" type="datetimeFigureOut">
               <a:rPr lang="en-SG" smtClean="0"/>
-              <a:t>6/7/2018</a:t>
+              <a:t>25/10/2018</a:t>
             </a:fld>
             <a:endParaRPr lang="en-SG"/>
           </a:p>
@@ -465,7 +461,7 @@
           <a:p>
             <a:fld id="{542F47FF-5056-41FF-A1F8-23A414798AA4}" type="datetimeFigureOut">
               <a:rPr lang="en-SG" smtClean="0"/>
-              <a:t>6/7/2018</a:t>
+              <a:t>25/10/2018</a:t>
             </a:fld>
             <a:endParaRPr lang="en-SG"/>
           </a:p>
@@ -675,7 +671,7 @@
           <a:p>
             <a:fld id="{542F47FF-5056-41FF-A1F8-23A414798AA4}" type="datetimeFigureOut">
               <a:rPr lang="en-SG" smtClean="0"/>
-              <a:t>6/7/2018</a:t>
+              <a:t>25/10/2018</a:t>
             </a:fld>
             <a:endParaRPr lang="en-SG"/>
           </a:p>
@@ -875,7 +871,7 @@
           <a:p>
             <a:fld id="{542F47FF-5056-41FF-A1F8-23A414798AA4}" type="datetimeFigureOut">
               <a:rPr lang="en-SG" smtClean="0"/>
-              <a:t>6/7/2018</a:t>
+              <a:t>25/10/2018</a:t>
             </a:fld>
             <a:endParaRPr lang="en-SG"/>
           </a:p>
@@ -1151,7 +1147,7 @@
           <a:p>
             <a:fld id="{542F47FF-5056-41FF-A1F8-23A414798AA4}" type="datetimeFigureOut">
               <a:rPr lang="en-SG" smtClean="0"/>
-              <a:t>6/7/2018</a:t>
+              <a:t>25/10/2018</a:t>
             </a:fld>
             <a:endParaRPr lang="en-SG"/>
           </a:p>
@@ -1419,7 +1415,7 @@
           <a:p>
             <a:fld id="{542F47FF-5056-41FF-A1F8-23A414798AA4}" type="datetimeFigureOut">
               <a:rPr lang="en-SG" smtClean="0"/>
-              <a:t>6/7/2018</a:t>
+              <a:t>25/10/2018</a:t>
             </a:fld>
             <a:endParaRPr lang="en-SG"/>
           </a:p>
@@ -1834,7 +1830,7 @@
           <a:p>
             <a:fld id="{542F47FF-5056-41FF-A1F8-23A414798AA4}" type="datetimeFigureOut">
               <a:rPr lang="en-SG" smtClean="0"/>
-              <a:t>6/7/2018</a:t>
+              <a:t>25/10/2018</a:t>
             </a:fld>
             <a:endParaRPr lang="en-SG"/>
           </a:p>
@@ -1976,7 +1972,7 @@
           <a:p>
             <a:fld id="{542F47FF-5056-41FF-A1F8-23A414798AA4}" type="datetimeFigureOut">
               <a:rPr lang="en-SG" smtClean="0"/>
-              <a:t>6/7/2018</a:t>
+              <a:t>25/10/2018</a:t>
             </a:fld>
             <a:endParaRPr lang="en-SG"/>
           </a:p>
@@ -2089,7 +2085,7 @@
           <a:p>
             <a:fld id="{542F47FF-5056-41FF-A1F8-23A414798AA4}" type="datetimeFigureOut">
               <a:rPr lang="en-SG" smtClean="0"/>
-              <a:t>6/7/2018</a:t>
+              <a:t>25/10/2018</a:t>
             </a:fld>
             <a:endParaRPr lang="en-SG"/>
           </a:p>
@@ -2402,7 +2398,7 @@
           <a:p>
             <a:fld id="{542F47FF-5056-41FF-A1F8-23A414798AA4}" type="datetimeFigureOut">
               <a:rPr lang="en-SG" smtClean="0"/>
-              <a:t>6/7/2018</a:t>
+              <a:t>25/10/2018</a:t>
             </a:fld>
             <a:endParaRPr lang="en-SG"/>
           </a:p>
@@ -2691,7 +2687,7 @@
           <a:p>
             <a:fld id="{542F47FF-5056-41FF-A1F8-23A414798AA4}" type="datetimeFigureOut">
               <a:rPr lang="en-SG" smtClean="0"/>
-              <a:t>6/7/2018</a:t>
+              <a:t>25/10/2018</a:t>
             </a:fld>
             <a:endParaRPr lang="en-SG"/>
           </a:p>
@@ -2934,7 +2930,7 @@
           <a:p>
             <a:fld id="{542F47FF-5056-41FF-A1F8-23A414798AA4}" type="datetimeFigureOut">
               <a:rPr lang="en-SG" smtClean="0"/>
-              <a:t>6/7/2018</a:t>
+              <a:t>25/10/2018</a:t>
             </a:fld>
             <a:endParaRPr lang="en-SG"/>
           </a:p>
@@ -3656,7 +3652,7 @@
             </a:r>
             <a:r>
               <a:rPr lang="en-US" dirty="0"/>
-              <a:t>command commits address book]</a:t>
+              <a:t>command commits scheduler]</a:t>
             </a:r>
             <a:endParaRPr lang="en-SG" sz="1801" dirty="0"/>
           </a:p>
@@ -3709,11 +3705,11 @@
             <a:pPr algn="ctr"/>
             <a:r>
               <a:rPr lang="en-SG" sz="1801" dirty="0"/>
-              <a:t>Purge redundant states and then save address book to </a:t>
+              <a:t>Purge redundant states and then save scheduler to </a:t>
             </a:r>
             <a:r>
               <a:rPr lang="en-SG" sz="1801" dirty="0" err="1"/>
-              <a:t>addressBookStateList</a:t>
+              <a:t>schedulerStateList</a:t>
             </a:r>
             <a:r>
               <a:rPr lang="en-SG" sz="1801" dirty="0"/>

</xml_diff>

<commit_message>
- update UGDG for undoredo - update ivan PPP
</commit_message>
<xml_diff>
--- a/docs/diagrams/UndoRedoActivityDiagram.pptx
+++ b/docs/diagrams/UndoRedoActivityDiagram.pptx
@@ -261,7 +261,7 @@
           <a:p>
             <a:fld id="{542F47FF-5056-41FF-A1F8-23A414798AA4}" type="datetimeFigureOut">
               <a:rPr lang="en-SG" smtClean="0"/>
-              <a:t>17/10/18</a:t>
+              <a:t>1/11/18</a:t>
             </a:fld>
             <a:endParaRPr lang="en-SG"/>
           </a:p>
@@ -461,7 +461,7 @@
           <a:p>
             <a:fld id="{542F47FF-5056-41FF-A1F8-23A414798AA4}" type="datetimeFigureOut">
               <a:rPr lang="en-SG" smtClean="0"/>
-              <a:t>17/10/18</a:t>
+              <a:t>1/11/18</a:t>
             </a:fld>
             <a:endParaRPr lang="en-SG"/>
           </a:p>
@@ -671,7 +671,7 @@
           <a:p>
             <a:fld id="{542F47FF-5056-41FF-A1F8-23A414798AA4}" type="datetimeFigureOut">
               <a:rPr lang="en-SG" smtClean="0"/>
-              <a:t>17/10/18</a:t>
+              <a:t>1/11/18</a:t>
             </a:fld>
             <a:endParaRPr lang="en-SG"/>
           </a:p>
@@ -871,7 +871,7 @@
           <a:p>
             <a:fld id="{542F47FF-5056-41FF-A1F8-23A414798AA4}" type="datetimeFigureOut">
               <a:rPr lang="en-SG" smtClean="0"/>
-              <a:t>17/10/18</a:t>
+              <a:t>1/11/18</a:t>
             </a:fld>
             <a:endParaRPr lang="en-SG"/>
           </a:p>
@@ -1147,7 +1147,7 @@
           <a:p>
             <a:fld id="{542F47FF-5056-41FF-A1F8-23A414798AA4}" type="datetimeFigureOut">
               <a:rPr lang="en-SG" smtClean="0"/>
-              <a:t>17/10/18</a:t>
+              <a:t>1/11/18</a:t>
             </a:fld>
             <a:endParaRPr lang="en-SG"/>
           </a:p>
@@ -1415,7 +1415,7 @@
           <a:p>
             <a:fld id="{542F47FF-5056-41FF-A1F8-23A414798AA4}" type="datetimeFigureOut">
               <a:rPr lang="en-SG" smtClean="0"/>
-              <a:t>17/10/18</a:t>
+              <a:t>1/11/18</a:t>
             </a:fld>
             <a:endParaRPr lang="en-SG"/>
           </a:p>
@@ -1830,7 +1830,7 @@
           <a:p>
             <a:fld id="{542F47FF-5056-41FF-A1F8-23A414798AA4}" type="datetimeFigureOut">
               <a:rPr lang="en-SG" smtClean="0"/>
-              <a:t>17/10/18</a:t>
+              <a:t>1/11/18</a:t>
             </a:fld>
             <a:endParaRPr lang="en-SG"/>
           </a:p>
@@ -1972,7 +1972,7 @@
           <a:p>
             <a:fld id="{542F47FF-5056-41FF-A1F8-23A414798AA4}" type="datetimeFigureOut">
               <a:rPr lang="en-SG" smtClean="0"/>
-              <a:t>17/10/18</a:t>
+              <a:t>1/11/18</a:t>
             </a:fld>
             <a:endParaRPr lang="en-SG"/>
           </a:p>
@@ -2085,7 +2085,7 @@
           <a:p>
             <a:fld id="{542F47FF-5056-41FF-A1F8-23A414798AA4}" type="datetimeFigureOut">
               <a:rPr lang="en-SG" smtClean="0"/>
-              <a:t>17/10/18</a:t>
+              <a:t>1/11/18</a:t>
             </a:fld>
             <a:endParaRPr lang="en-SG"/>
           </a:p>
@@ -2398,7 +2398,7 @@
           <a:p>
             <a:fld id="{542F47FF-5056-41FF-A1F8-23A414798AA4}" type="datetimeFigureOut">
               <a:rPr lang="en-SG" smtClean="0"/>
-              <a:t>17/10/18</a:t>
+              <a:t>1/11/18</a:t>
             </a:fld>
             <a:endParaRPr lang="en-SG"/>
           </a:p>
@@ -2687,7 +2687,7 @@
           <a:p>
             <a:fld id="{542F47FF-5056-41FF-A1F8-23A414798AA4}" type="datetimeFigureOut">
               <a:rPr lang="en-SG" smtClean="0"/>
-              <a:t>17/10/18</a:t>
+              <a:t>1/11/18</a:t>
             </a:fld>
             <a:endParaRPr lang="en-SG"/>
           </a:p>
@@ -2930,7 +2930,7 @@
           <a:p>
             <a:fld id="{542F47FF-5056-41FF-A1F8-23A414798AA4}" type="datetimeFigureOut">
               <a:rPr lang="en-SG" smtClean="0"/>
-              <a:t>17/10/18</a:t>
+              <a:t>1/11/18</a:t>
             </a:fld>
             <a:endParaRPr lang="en-SG"/>
           </a:p>
@@ -3361,7 +3361,7 @@
         </p:nvSpPr>
         <p:spPr>
           <a:xfrm>
-            <a:off x="2680041" y="3197106"/>
+            <a:off x="759801" y="3197106"/>
             <a:ext cx="235669" cy="235669"/>
           </a:xfrm>
           <a:prstGeom prst="ellipse">
@@ -3408,13 +3408,12 @@
           <p:cNvCxnSpPr>
             <a:cxnSpLocks/>
             <a:stCxn id="4" idx="6"/>
-            <a:endCxn id="8" idx="1"/>
           </p:cNvCxnSpPr>
           <p:nvPr/>
         </p:nvCxnSpPr>
         <p:spPr>
           <a:xfrm>
-            <a:off x="2915710" y="3314941"/>
+            <a:off x="995470" y="3314941"/>
             <a:ext cx="227605" cy="839"/>
           </a:xfrm>
           <a:prstGeom prst="straightConnector1">
@@ -3453,8 +3452,8 @@
         </p:nvSpPr>
         <p:spPr>
           <a:xfrm>
-            <a:off x="3143315" y="2957561"/>
-            <a:ext cx="1570355" cy="716437"/>
+            <a:off x="1257664" y="2954611"/>
+            <a:ext cx="1908607" cy="716437"/>
           </a:xfrm>
           <a:prstGeom prst="roundRect">
             <a:avLst/>
@@ -3486,7 +3485,7 @@
             <a:pPr algn="ctr"/>
             <a:r>
               <a:rPr lang="en-SG" sz="1801" dirty="0"/>
-              <a:t>User executes command</a:t>
+              <a:t>User executes transformation</a:t>
             </a:r>
           </a:p>
         </p:txBody>
@@ -3503,14 +3502,13 @@
           <p:cNvCxnSpPr>
             <a:cxnSpLocks/>
             <a:stCxn id="8" idx="3"/>
-            <a:endCxn id="56" idx="1"/>
           </p:cNvCxnSpPr>
           <p:nvPr/>
         </p:nvCxnSpPr>
         <p:spPr>
           <a:xfrm flipV="1">
-            <a:off x="4713670" y="3312830"/>
-            <a:ext cx="1043331" cy="2950"/>
+            <a:off x="3166271" y="3312829"/>
+            <a:ext cx="697069" cy="1"/>
           </a:xfrm>
           <a:prstGeom prst="straightConnector1">
             <a:avLst/>
@@ -3548,7 +3546,7 @@
         </p:nvSpPr>
         <p:spPr>
           <a:xfrm>
-            <a:off x="9650678" y="3075397"/>
+            <a:off x="6985014" y="3092485"/>
             <a:ext cx="480766" cy="480766"/>
           </a:xfrm>
           <a:prstGeom prst="diamond">
@@ -3597,7 +3595,7 @@
         </p:nvSpPr>
         <p:spPr>
           <a:xfrm>
-            <a:off x="5345870" y="3793595"/>
+            <a:off x="4019990" y="3813387"/>
             <a:ext cx="853127" cy="369460"/>
           </a:xfrm>
           <a:prstGeom prst="rect">
@@ -3632,8 +3630,8 @@
         </p:nvSpPr>
         <p:spPr>
           <a:xfrm>
-            <a:off x="4412106" y="2182578"/>
-            <a:ext cx="2066045" cy="553998"/>
+            <a:off x="2788920" y="2007116"/>
+            <a:ext cx="1891041" cy="769441"/>
           </a:xfrm>
           <a:prstGeom prst="rect">
             <a:avLst/>
@@ -3652,7 +3650,7 @@
             </a:r>
             <a:r>
               <a:rPr lang="en-US" sz="1400" dirty="0"/>
-              <a:t>command commits previewImageManager]</a:t>
+              <a:t>currentIndex is not pointing at the last state (currentSize -1)]</a:t>
             </a:r>
             <a:endParaRPr lang="en-SG" sz="1600" dirty="0"/>
           </a:p>
@@ -3672,8 +3670,8 @@
         </p:nvSpPr>
         <p:spPr>
           <a:xfrm>
-            <a:off x="6478151" y="2438400"/>
-            <a:ext cx="2953232" cy="814659"/>
+            <a:off x="4581005" y="2468228"/>
+            <a:ext cx="2231275" cy="814659"/>
           </a:xfrm>
           <a:prstGeom prst="roundRect">
             <a:avLst/>
@@ -3705,7 +3703,7 @@
             <a:pPr algn="ctr"/>
             <a:r>
               <a:rPr lang="en-SG" sz="1400" dirty="0"/>
-              <a:t>Purge redundant states, then update the model’s previewImage by requesting for currentPreviewImageState</a:t>
+              <a:t>Purge redundant states (states after currentIndex)</a:t>
             </a:r>
           </a:p>
         </p:txBody>
@@ -3724,7 +3722,7 @@
         </p:nvSpPr>
         <p:spPr>
           <a:xfrm>
-            <a:off x="5757001" y="3072447"/>
+            <a:off x="3863340" y="3082926"/>
             <a:ext cx="480766" cy="480766"/>
           </a:xfrm>
           <a:prstGeom prst="diamond">
@@ -3771,14 +3769,13 @@
           <p:cNvCxnSpPr>
             <a:cxnSpLocks/>
             <a:stCxn id="46" idx="3"/>
-            <a:endCxn id="68" idx="2"/>
           </p:cNvCxnSpPr>
           <p:nvPr/>
         </p:nvCxnSpPr>
         <p:spPr>
           <a:xfrm>
-            <a:off x="10131444" y="3315780"/>
-            <a:ext cx="419377" cy="7529"/>
+            <a:off x="7465780" y="3332868"/>
+            <a:ext cx="603800" cy="0"/>
           </a:xfrm>
           <a:prstGeom prst="straightConnector1">
             <a:avLst/>
@@ -3816,7 +3813,7 @@
         </p:nvGrpSpPr>
         <p:grpSpPr>
           <a:xfrm>
-            <a:off x="10550821" y="3205474"/>
+            <a:off x="10630831" y="3205474"/>
             <a:ext cx="235669" cy="235669"/>
             <a:chOff x="8040730" y="5082186"/>
             <a:chExt cx="235669" cy="235669"/>
@@ -3934,7 +3931,7 @@
         </p:nvCxnSpPr>
         <p:spPr>
           <a:xfrm rot="5400000" flipH="1" flipV="1">
-            <a:off x="6123581" y="2716584"/>
+            <a:off x="4229920" y="2727063"/>
             <a:ext cx="229667" cy="482060"/>
           </a:xfrm>
           <a:prstGeom prst="bentConnector2">
@@ -3970,12 +3967,12 @@
         </p:nvCxnSpPr>
         <p:spPr>
           <a:xfrm rot="16200000" flipH="1">
-            <a:off x="7942747" y="1607849"/>
-            <a:ext cx="2950" cy="3893677"/>
+            <a:off x="5659781" y="2007634"/>
+            <a:ext cx="9559" cy="3121674"/>
           </a:xfrm>
           <a:prstGeom prst="bentConnector3">
             <a:avLst>
-              <a:gd name="adj1" fmla="val 7849153"/>
+              <a:gd name="adj1" fmla="val 2491464"/>
             </a:avLst>
           </a:prstGeom>
           <a:ln>
@@ -4001,6 +3998,7 @@
         <p:nvCxnSpPr>
           <p:cNvPr id="74" name="Elbow Connector 73"/>
           <p:cNvCxnSpPr>
+            <a:cxnSpLocks/>
             <a:stCxn id="51" idx="3"/>
             <a:endCxn id="46" idx="0"/>
           </p:cNvCxnSpPr>
@@ -4008,10 +4006,103 @@
         </p:nvCxnSpPr>
         <p:spPr>
           <a:xfrm>
-            <a:off x="9431383" y="2845730"/>
-            <a:ext cx="459678" cy="229667"/>
+            <a:off x="6812280" y="2875558"/>
+            <a:ext cx="413117" cy="216927"/>
           </a:xfrm>
           <a:prstGeom prst="bentConnector2">
+            <a:avLst/>
+          </a:prstGeom>
+          <a:ln>
+            <a:tailEnd type="triangle"/>
+          </a:ln>
+        </p:spPr>
+        <p:style>
+          <a:lnRef idx="1">
+            <a:schemeClr val="dk1"/>
+          </a:lnRef>
+          <a:fillRef idx="0">
+            <a:schemeClr val="dk1"/>
+          </a:fillRef>
+          <a:effectRef idx="0">
+            <a:schemeClr val="dk1"/>
+          </a:effectRef>
+          <a:fontRef idx="minor">
+            <a:schemeClr val="tx1"/>
+          </a:fontRef>
+        </p:style>
+      </p:cxnSp>
+      <p:sp>
+        <p:nvSpPr>
+          <p:cNvPr id="27" name="Rectangle: Rounded Corners 7">
+            <a:extLst>
+              <a:ext uri="{FF2B5EF4-FFF2-40B4-BE49-F238E27FC236}">
+                <a16:creationId xmlns:a16="http://schemas.microsoft.com/office/drawing/2014/main" id="{118796D2-1FE6-A74D-82D7-AD6559BE3020}"/>
+              </a:ext>
+            </a:extLst>
+          </p:cNvPr>
+          <p:cNvSpPr/>
+          <p:nvPr/>
+        </p:nvSpPr>
+        <p:spPr>
+          <a:xfrm>
+            <a:off x="8094002" y="2488209"/>
+            <a:ext cx="1933029" cy="1649240"/>
+          </a:xfrm>
+          <a:prstGeom prst="roundRect">
+            <a:avLst/>
+          </a:prstGeom>
+        </p:spPr>
+        <p:style>
+          <a:lnRef idx="1">
+            <a:schemeClr val="accent5"/>
+          </a:lnRef>
+          <a:fillRef idx="2">
+            <a:schemeClr val="accent5"/>
+          </a:fillRef>
+          <a:effectRef idx="1">
+            <a:schemeClr val="accent5"/>
+          </a:effectRef>
+          <a:fontRef idx="minor">
+            <a:schemeClr val="dk1"/>
+          </a:fontRef>
+        </p:style>
+        <p:txBody>
+          <a:bodyPr rot="0" spcFirstLastPara="0" vertOverflow="overflow" horzOverflow="overflow" vert="horz" wrap="square" lIns="91440" tIns="45721" rIns="91440" bIns="45721" numCol="1" spcCol="0" rtlCol="0" fromWordArt="0" anchor="ctr" anchorCtr="0" forceAA="0" compatLnSpc="1">
+            <a:prstTxWarp prst="textNoShape">
+              <a:avLst/>
+            </a:prstTxWarp>
+            <a:noAutofit/>
+          </a:bodyPr>
+          <a:lstStyle/>
+          <a:p>
+            <a:pPr algn="ctr"/>
+            <a:r>
+              <a:rPr lang="en-SG" sz="1200" dirty="0"/>
+              <a:t>Increment currentSize and currentIndex, cache the transformed image. Update the UI with a ChangeImageEvent with the newly transformed image.</a:t>
+            </a:r>
+          </a:p>
+        </p:txBody>
+      </p:sp>
+      <p:cxnSp>
+        <p:nvCxnSpPr>
+          <p:cNvPr id="29" name="Straight Arrow Connector 28">
+            <a:extLst>
+              <a:ext uri="{FF2B5EF4-FFF2-40B4-BE49-F238E27FC236}">
+                <a16:creationId xmlns:a16="http://schemas.microsoft.com/office/drawing/2014/main" id="{9D3386A4-521B-FF44-AF6B-431F2B27BB56}"/>
+              </a:ext>
+            </a:extLst>
+          </p:cNvPr>
+          <p:cNvCxnSpPr>
+            <a:cxnSpLocks/>
+          </p:cNvCxnSpPr>
+          <p:nvPr/>
+        </p:nvCxnSpPr>
+        <p:spPr>
+          <a:xfrm>
+            <a:off x="10027031" y="3312829"/>
+            <a:ext cx="603800" cy="0"/>
+          </a:xfrm>
+          <a:prstGeom prst="straightConnector1">
             <a:avLst/>
           </a:prstGeom>
           <a:ln>

</xml_diff>

<commit_message>
docs/images: Update AddressBook to RestaurantBook in UndoRedo images
</commit_message>
<xml_diff>
--- a/docs/diagrams/UndoRedoActivityDiagram.pptx
+++ b/docs/diagrams/UndoRedoActivityDiagram.pptx
@@ -112,10 +112,6 @@
 </p:presentation>
 </file>
 
-<file path=ppt/revisionInfo.xml><?xml version="1.0" encoding="utf-8"?>
-<p1510:revInfo xmlns:a="http://schemas.openxmlformats.org/drawingml/2006/main" xmlns:r="http://schemas.openxmlformats.org/officeDocument/2006/relationships" xmlns:p1510="http://schemas.microsoft.com/office/powerpoint/2015/10/main"/>
-</file>
-
 <file path=ppt/slideLayouts/slideLayout1.xml><?xml version="1.0" encoding="utf-8"?>
 <p:sldLayout xmlns:a="http://schemas.openxmlformats.org/drawingml/2006/main" xmlns:r="http://schemas.openxmlformats.org/officeDocument/2006/relationships" xmlns:p="http://schemas.openxmlformats.org/presentationml/2006/main" type="title" preserve="1">
   <p:cSld name="Title Slide">
@@ -265,7 +261,7 @@
           <a:p>
             <a:fld id="{542F47FF-5056-41FF-A1F8-23A414798AA4}" type="datetimeFigureOut">
               <a:rPr lang="en-SG" smtClean="0"/>
-              <a:t>6/7/2018</a:t>
+              <a:t>9/11/2018</a:t>
             </a:fld>
             <a:endParaRPr lang="en-SG"/>
           </a:p>
@@ -465,7 +461,7 @@
           <a:p>
             <a:fld id="{542F47FF-5056-41FF-A1F8-23A414798AA4}" type="datetimeFigureOut">
               <a:rPr lang="en-SG" smtClean="0"/>
-              <a:t>6/7/2018</a:t>
+              <a:t>9/11/2018</a:t>
             </a:fld>
             <a:endParaRPr lang="en-SG"/>
           </a:p>
@@ -675,7 +671,7 @@
           <a:p>
             <a:fld id="{542F47FF-5056-41FF-A1F8-23A414798AA4}" type="datetimeFigureOut">
               <a:rPr lang="en-SG" smtClean="0"/>
-              <a:t>6/7/2018</a:t>
+              <a:t>9/11/2018</a:t>
             </a:fld>
             <a:endParaRPr lang="en-SG"/>
           </a:p>
@@ -875,7 +871,7 @@
           <a:p>
             <a:fld id="{542F47FF-5056-41FF-A1F8-23A414798AA4}" type="datetimeFigureOut">
               <a:rPr lang="en-SG" smtClean="0"/>
-              <a:t>6/7/2018</a:t>
+              <a:t>9/11/2018</a:t>
             </a:fld>
             <a:endParaRPr lang="en-SG"/>
           </a:p>
@@ -1151,7 +1147,7 @@
           <a:p>
             <a:fld id="{542F47FF-5056-41FF-A1F8-23A414798AA4}" type="datetimeFigureOut">
               <a:rPr lang="en-SG" smtClean="0"/>
-              <a:t>6/7/2018</a:t>
+              <a:t>9/11/2018</a:t>
             </a:fld>
             <a:endParaRPr lang="en-SG"/>
           </a:p>
@@ -1419,7 +1415,7 @@
           <a:p>
             <a:fld id="{542F47FF-5056-41FF-A1F8-23A414798AA4}" type="datetimeFigureOut">
               <a:rPr lang="en-SG" smtClean="0"/>
-              <a:t>6/7/2018</a:t>
+              <a:t>9/11/2018</a:t>
             </a:fld>
             <a:endParaRPr lang="en-SG"/>
           </a:p>
@@ -1834,7 +1830,7 @@
           <a:p>
             <a:fld id="{542F47FF-5056-41FF-A1F8-23A414798AA4}" type="datetimeFigureOut">
               <a:rPr lang="en-SG" smtClean="0"/>
-              <a:t>6/7/2018</a:t>
+              <a:t>9/11/2018</a:t>
             </a:fld>
             <a:endParaRPr lang="en-SG"/>
           </a:p>
@@ -1976,7 +1972,7 @@
           <a:p>
             <a:fld id="{542F47FF-5056-41FF-A1F8-23A414798AA4}" type="datetimeFigureOut">
               <a:rPr lang="en-SG" smtClean="0"/>
-              <a:t>6/7/2018</a:t>
+              <a:t>9/11/2018</a:t>
             </a:fld>
             <a:endParaRPr lang="en-SG"/>
           </a:p>
@@ -2089,7 +2085,7 @@
           <a:p>
             <a:fld id="{542F47FF-5056-41FF-A1F8-23A414798AA4}" type="datetimeFigureOut">
               <a:rPr lang="en-SG" smtClean="0"/>
-              <a:t>6/7/2018</a:t>
+              <a:t>9/11/2018</a:t>
             </a:fld>
             <a:endParaRPr lang="en-SG"/>
           </a:p>
@@ -2402,7 +2398,7 @@
           <a:p>
             <a:fld id="{542F47FF-5056-41FF-A1F8-23A414798AA4}" type="datetimeFigureOut">
               <a:rPr lang="en-SG" smtClean="0"/>
-              <a:t>6/7/2018</a:t>
+              <a:t>9/11/2018</a:t>
             </a:fld>
             <a:endParaRPr lang="en-SG"/>
           </a:p>
@@ -2691,7 +2687,7 @@
           <a:p>
             <a:fld id="{542F47FF-5056-41FF-A1F8-23A414798AA4}" type="datetimeFigureOut">
               <a:rPr lang="en-SG" smtClean="0"/>
-              <a:t>6/7/2018</a:t>
+              <a:t>9/11/2018</a:t>
             </a:fld>
             <a:endParaRPr lang="en-SG"/>
           </a:p>
@@ -2934,7 +2930,7 @@
           <a:p>
             <a:fld id="{542F47FF-5056-41FF-A1F8-23A414798AA4}" type="datetimeFigureOut">
               <a:rPr lang="en-SG" smtClean="0"/>
-              <a:t>6/7/2018</a:t>
+              <a:t>9/11/2018</a:t>
             </a:fld>
             <a:endParaRPr lang="en-SG"/>
           </a:p>
@@ -3656,7 +3652,7 @@
             </a:r>
             <a:r>
               <a:rPr lang="en-US" dirty="0"/>
-              <a:t>command commits address book]</a:t>
+              <a:t>command commits restaurant book]</a:t>
             </a:r>
             <a:endParaRPr lang="en-SG" sz="1801" dirty="0"/>
           </a:p>
@@ -3713,7 +3709,7 @@
             </a:r>
             <a:r>
               <a:rPr lang="en-SG" sz="1801" dirty="0" err="1"/>
-              <a:t>addressBookStateList</a:t>
+              <a:t>restaurantBookStateList</a:t>
             </a:r>
             <a:r>
               <a:rPr lang="en-SG" sz="1801" dirty="0"/>

</xml_diff>